<commit_message>
- Bug Fixes on analytics docs
</commit_message>
<xml_diff>
--- a/docs/Everest(intelligent_traffic_steering).pptx
+++ b/docs/Everest(intelligent_traffic_steering).pptx
@@ -23612,7 +23612,7 @@
       </p:grpSp>
       <p:sp>
         <p:nvSpPr>
-          <p:cNvPr id="705" name="Straight Arrow Connector 6"/>
+          <p:cNvPr id="707" name="Straight Arrow Connector 6"/>
           <p:cNvSpPr/>
           <p:nvPr/>
         </p:nvSpPr>
@@ -24760,7 +24760,7 @@
       </p:grpSp>
       <p:sp>
         <p:nvSpPr>
-          <p:cNvPr id="706" name="Straight Arrow Connector 6"/>
+          <p:cNvPr id="708" name="Straight Arrow Connector 6"/>
           <p:cNvSpPr/>
           <p:nvPr/>
         </p:nvSpPr>
@@ -25439,7 +25439,7 @@
       </p:grpSp>
       <p:sp>
         <p:nvSpPr>
-          <p:cNvPr id="707" name="Straight Arrow Connector 6"/>
+          <p:cNvPr id="709" name="Straight Arrow Connector 6"/>
           <p:cNvSpPr/>
           <p:nvPr/>
         </p:nvSpPr>
@@ -26118,7 +26118,7 @@
       </p:grpSp>
       <p:sp>
         <p:nvSpPr>
-          <p:cNvPr id="708" name="Straight Arrow Connector 6"/>
+          <p:cNvPr id="710" name="Straight Arrow Connector 6"/>
           <p:cNvSpPr/>
           <p:nvPr/>
         </p:nvSpPr>
@@ -26797,7 +26797,7 @@
       </p:grpSp>
       <p:sp>
         <p:nvSpPr>
-          <p:cNvPr id="709" name="Straight Arrow Connector 6"/>
+          <p:cNvPr id="711" name="Straight Arrow Connector 6"/>
           <p:cNvSpPr/>
           <p:nvPr/>
         </p:nvSpPr>
@@ -29454,6 +29454,146 @@
           </p:txBody>
         </p:sp>
       </p:grpSp>
+      <p:sp>
+        <p:nvSpPr>
+          <p:cNvPr id="705" name="Everest-sink…"/>
+          <p:cNvSpPr/>
+          <p:nvPr/>
+        </p:nvSpPr>
+        <p:spPr>
+          <a:xfrm>
+            <a:off x="9824504" y="2844616"/>
+            <a:ext cx="1166493" cy="421761"/>
+          </a:xfrm>
+          <a:prstGeom prst="roundRect">
+            <a:avLst>
+              <a:gd name="adj" fmla="val 39419"/>
+            </a:avLst>
+          </a:prstGeom>
+          <a:gradFill>
+            <a:gsLst>
+              <a:gs pos="0">
+                <a:srgbClr val="6B8ADA"/>
+              </a:gs>
+              <a:gs pos="100000">
+                <a:schemeClr val="accent6">
+                  <a:hueOff val="172405"/>
+                  <a:satOff val="54054"/>
+                  <a:lumOff val="21186"/>
+                </a:schemeClr>
+              </a:gs>
+            </a:gsLst>
+            <a:lin ang="16200000"/>
+          </a:gradFill>
+          <a:ln w="25400">
+            <a:solidFill>
+              <a:schemeClr val="accent1"/>
+            </a:solidFill>
+          </a:ln>
+          <a:effectLst>
+            <a:outerShdw sx="100000" sy="100000" kx="0" ky="0" algn="b" rotWithShape="0" blurRad="38100" dist="20000" dir="5400000">
+              <a:srgbClr val="000000">
+                <a:alpha val="38000"/>
+              </a:srgbClr>
+            </a:outerShdw>
+          </a:effectLst>
+          <a:extLst>
+            <a:ext uri="{C572A759-6A51-4108-AA02-DFA0A04FC94B}">
+              <ma14:wrappingTextBoxFlag xmlns:ma14="http://schemas.microsoft.com/office/mac/drawingml/2011/main" val="1"/>
+            </a:ext>
+          </a:extLst>
+        </p:spPr>
+        <p:txBody>
+          <a:bodyPr lIns="45718" tIns="45718" rIns="45718" bIns="45718" anchor="ctr"/>
+          <a:lstStyle/>
+          <a:p>
+            <a:pPr algn="ctr">
+              <a:defRPr i="1" sz="1000"/>
+            </a:pPr>
+            <a:r>
+              <a:t>Everest-sink</a:t>
+            </a:r>
+          </a:p>
+          <a:p>
+            <a:pPr algn="ctr">
+              <a:defRPr i="1" sz="1000"/>
+            </a:pPr>
+            <a:r>
+              <a:t>(job)</a:t>
+            </a:r>
+          </a:p>
+        </p:txBody>
+      </p:sp>
+      <p:sp>
+        <p:nvSpPr>
+          <p:cNvPr id="706" name="Everest-sink…"/>
+          <p:cNvSpPr/>
+          <p:nvPr/>
+        </p:nvSpPr>
+        <p:spPr>
+          <a:xfrm>
+            <a:off x="9859185" y="3828468"/>
+            <a:ext cx="1166493" cy="421761"/>
+          </a:xfrm>
+          <a:prstGeom prst="roundRect">
+            <a:avLst>
+              <a:gd name="adj" fmla="val 39419"/>
+            </a:avLst>
+          </a:prstGeom>
+          <a:gradFill>
+            <a:gsLst>
+              <a:gs pos="0">
+                <a:srgbClr val="6B8ADA"/>
+              </a:gs>
+              <a:gs pos="100000">
+                <a:schemeClr val="accent6">
+                  <a:hueOff val="172405"/>
+                  <a:satOff val="54054"/>
+                  <a:lumOff val="21186"/>
+                </a:schemeClr>
+              </a:gs>
+            </a:gsLst>
+            <a:lin ang="16200000"/>
+          </a:gradFill>
+          <a:ln w="25400">
+            <a:solidFill>
+              <a:schemeClr val="accent1"/>
+            </a:solidFill>
+          </a:ln>
+          <a:effectLst>
+            <a:outerShdw sx="100000" sy="100000" kx="0" ky="0" algn="b" rotWithShape="0" blurRad="38100" dist="20000" dir="5400000">
+              <a:srgbClr val="000000">
+                <a:alpha val="38000"/>
+              </a:srgbClr>
+            </a:outerShdw>
+          </a:effectLst>
+          <a:extLst>
+            <a:ext uri="{C572A759-6A51-4108-AA02-DFA0A04FC94B}">
+              <ma14:wrappingTextBoxFlag xmlns:ma14="http://schemas.microsoft.com/office/mac/drawingml/2011/main" val="1"/>
+            </a:ext>
+          </a:extLst>
+        </p:spPr>
+        <p:txBody>
+          <a:bodyPr lIns="45718" tIns="45718" rIns="45718" bIns="45718" anchor="ctr"/>
+          <a:lstStyle/>
+          <a:p>
+            <a:pPr algn="ctr">
+              <a:defRPr i="1" sz="1000"/>
+            </a:pPr>
+            <a:r>
+              <a:t>Everest-sink</a:t>
+            </a:r>
+          </a:p>
+          <a:p>
+            <a:pPr algn="ctr">
+              <a:defRPr i="1" sz="1000"/>
+            </a:pPr>
+            <a:r>
+              <a:t>(job)</a:t>
+            </a:r>
+          </a:p>
+        </p:txBody>
+      </p:sp>
     </p:spTree>
   </p:cSld>
   <p:clrMapOvr>

</xml_diff>